<commit_message>
instructions for gpio readall for pi-4
</commit_message>
<xml_diff>
--- a/RaspiWiring.pptx
+++ b/RaspiWiring.pptx
@@ -261,7 +261,7 @@
           <a:p>
             <a:fld id="{16AA6F50-2625-484A-8F18-DF3F83B384C2}" type="datetimeFigureOut">
               <a:rPr lang="de-DE" smtClean="0"/>
-              <a:t>22.08.2021</a:t>
+              <a:t>25.08.2021</a:t>
             </a:fld>
             <a:endParaRPr lang="de-DE"/>
           </a:p>
@@ -461,7 +461,7 @@
           <a:p>
             <a:fld id="{16AA6F50-2625-484A-8F18-DF3F83B384C2}" type="datetimeFigureOut">
               <a:rPr lang="de-DE" smtClean="0"/>
-              <a:t>22.08.2021</a:t>
+              <a:t>25.08.2021</a:t>
             </a:fld>
             <a:endParaRPr lang="de-DE"/>
           </a:p>
@@ -671,7 +671,7 @@
           <a:p>
             <a:fld id="{16AA6F50-2625-484A-8F18-DF3F83B384C2}" type="datetimeFigureOut">
               <a:rPr lang="de-DE" smtClean="0"/>
-              <a:t>22.08.2021</a:t>
+              <a:t>25.08.2021</a:t>
             </a:fld>
             <a:endParaRPr lang="de-DE"/>
           </a:p>
@@ -871,7 +871,7 @@
           <a:p>
             <a:fld id="{16AA6F50-2625-484A-8F18-DF3F83B384C2}" type="datetimeFigureOut">
               <a:rPr lang="de-DE" smtClean="0"/>
-              <a:t>22.08.2021</a:t>
+              <a:t>25.08.2021</a:t>
             </a:fld>
             <a:endParaRPr lang="de-DE"/>
           </a:p>
@@ -1147,7 +1147,7 @@
           <a:p>
             <a:fld id="{16AA6F50-2625-484A-8F18-DF3F83B384C2}" type="datetimeFigureOut">
               <a:rPr lang="de-DE" smtClean="0"/>
-              <a:t>22.08.2021</a:t>
+              <a:t>25.08.2021</a:t>
             </a:fld>
             <a:endParaRPr lang="de-DE"/>
           </a:p>
@@ -1415,7 +1415,7 @@
           <a:p>
             <a:fld id="{16AA6F50-2625-484A-8F18-DF3F83B384C2}" type="datetimeFigureOut">
               <a:rPr lang="de-DE" smtClean="0"/>
-              <a:t>22.08.2021</a:t>
+              <a:t>25.08.2021</a:t>
             </a:fld>
             <a:endParaRPr lang="de-DE"/>
           </a:p>
@@ -1830,7 +1830,7 @@
           <a:p>
             <a:fld id="{16AA6F50-2625-484A-8F18-DF3F83B384C2}" type="datetimeFigureOut">
               <a:rPr lang="de-DE" smtClean="0"/>
-              <a:t>22.08.2021</a:t>
+              <a:t>25.08.2021</a:t>
             </a:fld>
             <a:endParaRPr lang="de-DE"/>
           </a:p>
@@ -1972,7 +1972,7 @@
           <a:p>
             <a:fld id="{16AA6F50-2625-484A-8F18-DF3F83B384C2}" type="datetimeFigureOut">
               <a:rPr lang="de-DE" smtClean="0"/>
-              <a:t>22.08.2021</a:t>
+              <a:t>25.08.2021</a:t>
             </a:fld>
             <a:endParaRPr lang="de-DE"/>
           </a:p>
@@ -2085,7 +2085,7 @@
           <a:p>
             <a:fld id="{16AA6F50-2625-484A-8F18-DF3F83B384C2}" type="datetimeFigureOut">
               <a:rPr lang="de-DE" smtClean="0"/>
-              <a:t>22.08.2021</a:t>
+              <a:t>25.08.2021</a:t>
             </a:fld>
             <a:endParaRPr lang="de-DE"/>
           </a:p>
@@ -2398,7 +2398,7 @@
           <a:p>
             <a:fld id="{16AA6F50-2625-484A-8F18-DF3F83B384C2}" type="datetimeFigureOut">
               <a:rPr lang="de-DE" smtClean="0"/>
-              <a:t>22.08.2021</a:t>
+              <a:t>25.08.2021</a:t>
             </a:fld>
             <a:endParaRPr lang="de-DE"/>
           </a:p>
@@ -2687,7 +2687,7 @@
           <a:p>
             <a:fld id="{16AA6F50-2625-484A-8F18-DF3F83B384C2}" type="datetimeFigureOut">
               <a:rPr lang="de-DE" smtClean="0"/>
-              <a:t>22.08.2021</a:t>
+              <a:t>25.08.2021</a:t>
             </a:fld>
             <a:endParaRPr lang="de-DE"/>
           </a:p>
@@ -2930,7 +2930,7 @@
           <a:p>
             <a:fld id="{16AA6F50-2625-484A-8F18-DF3F83B384C2}" type="datetimeFigureOut">
               <a:rPr lang="de-DE" smtClean="0"/>
-              <a:t>22.08.2021</a:t>
+              <a:t>25.08.2021</a:t>
             </a:fld>
             <a:endParaRPr lang="de-DE"/>
           </a:p>

</xml_diff>